<commit_message>
rmove all qutip package
</commit_message>
<xml_diff>
--- a/report/report_0603.pptx
+++ b/report/report_0603.pptx
@@ -8,17 +8,13 @@
     <p:sldId id="256" r:id="rId2"/>
     <p:sldId id="262" r:id="rId3"/>
     <p:sldId id="261" r:id="rId4"/>
-    <p:sldId id="259" r:id="rId5"/>
-    <p:sldId id="265" r:id="rId6"/>
-    <p:sldId id="268" r:id="rId7"/>
-    <p:sldId id="267" r:id="rId8"/>
-    <p:sldId id="263" r:id="rId9"/>
-    <p:sldId id="264" r:id="rId10"/>
-    <p:sldId id="266" r:id="rId11"/>
-    <p:sldId id="269" r:id="rId12"/>
-    <p:sldId id="270" r:id="rId13"/>
-    <p:sldId id="274" r:id="rId14"/>
-    <p:sldId id="275" r:id="rId15"/>
+    <p:sldId id="263" r:id="rId5"/>
+    <p:sldId id="264" r:id="rId6"/>
+    <p:sldId id="266" r:id="rId7"/>
+    <p:sldId id="269" r:id="rId8"/>
+    <p:sldId id="270" r:id="rId9"/>
+    <p:sldId id="274" r:id="rId10"/>
+    <p:sldId id="275" r:id="rId11"/>
   </p:sldIdLst>
   <p:sldSz cx="12192000" cy="6858000"/>
   <p:notesSz cx="6858000" cy="9144000"/>
@@ -256,7 +252,7 @@
           <a:p>
             <a:fld id="{926A52A2-628D-41AC-8D8D-9349A46921A5}" type="datetimeFigureOut">
               <a:rPr lang="zh-TW" altLang="en-US" smtClean="0"/>
-              <a:t>2020/6/3</a:t>
+              <a:t>2020/6/8</a:t>
             </a:fld>
             <a:endParaRPr lang="zh-TW" altLang="en-US"/>
           </a:p>
@@ -426,7 +422,7 @@
           <a:p>
             <a:fld id="{926A52A2-628D-41AC-8D8D-9349A46921A5}" type="datetimeFigureOut">
               <a:rPr lang="zh-TW" altLang="en-US" smtClean="0"/>
-              <a:t>2020/6/3</a:t>
+              <a:t>2020/6/8</a:t>
             </a:fld>
             <a:endParaRPr lang="zh-TW" altLang="en-US"/>
           </a:p>
@@ -606,7 +602,7 @@
           <a:p>
             <a:fld id="{926A52A2-628D-41AC-8D8D-9349A46921A5}" type="datetimeFigureOut">
               <a:rPr lang="zh-TW" altLang="en-US" smtClean="0"/>
-              <a:t>2020/6/3</a:t>
+              <a:t>2020/6/8</a:t>
             </a:fld>
             <a:endParaRPr lang="zh-TW" altLang="en-US"/>
           </a:p>
@@ -776,7 +772,7 @@
           <a:p>
             <a:fld id="{926A52A2-628D-41AC-8D8D-9349A46921A5}" type="datetimeFigureOut">
               <a:rPr lang="zh-TW" altLang="en-US" smtClean="0"/>
-              <a:t>2020/6/3</a:t>
+              <a:t>2020/6/8</a:t>
             </a:fld>
             <a:endParaRPr lang="zh-TW" altLang="en-US"/>
           </a:p>
@@ -1022,7 +1018,7 @@
           <a:p>
             <a:fld id="{926A52A2-628D-41AC-8D8D-9349A46921A5}" type="datetimeFigureOut">
               <a:rPr lang="zh-TW" altLang="en-US" smtClean="0"/>
-              <a:t>2020/6/3</a:t>
+              <a:t>2020/6/8</a:t>
             </a:fld>
             <a:endParaRPr lang="zh-TW" altLang="en-US"/>
           </a:p>
@@ -1254,7 +1250,7 @@
           <a:p>
             <a:fld id="{926A52A2-628D-41AC-8D8D-9349A46921A5}" type="datetimeFigureOut">
               <a:rPr lang="zh-TW" altLang="en-US" smtClean="0"/>
-              <a:t>2020/6/3</a:t>
+              <a:t>2020/6/8</a:t>
             </a:fld>
             <a:endParaRPr lang="zh-TW" altLang="en-US"/>
           </a:p>
@@ -1621,7 +1617,7 @@
           <a:p>
             <a:fld id="{926A52A2-628D-41AC-8D8D-9349A46921A5}" type="datetimeFigureOut">
               <a:rPr lang="zh-TW" altLang="en-US" smtClean="0"/>
-              <a:t>2020/6/3</a:t>
+              <a:t>2020/6/8</a:t>
             </a:fld>
             <a:endParaRPr lang="zh-TW" altLang="en-US"/>
           </a:p>
@@ -1739,7 +1735,7 @@
           <a:p>
             <a:fld id="{926A52A2-628D-41AC-8D8D-9349A46921A5}" type="datetimeFigureOut">
               <a:rPr lang="zh-TW" altLang="en-US" smtClean="0"/>
-              <a:t>2020/6/3</a:t>
+              <a:t>2020/6/8</a:t>
             </a:fld>
             <a:endParaRPr lang="zh-TW" altLang="en-US"/>
           </a:p>
@@ -1834,7 +1830,7 @@
           <a:p>
             <a:fld id="{926A52A2-628D-41AC-8D8D-9349A46921A5}" type="datetimeFigureOut">
               <a:rPr lang="zh-TW" altLang="en-US" smtClean="0"/>
-              <a:t>2020/6/3</a:t>
+              <a:t>2020/6/8</a:t>
             </a:fld>
             <a:endParaRPr lang="zh-TW" altLang="en-US"/>
           </a:p>
@@ -2111,7 +2107,7 @@
           <a:p>
             <a:fld id="{926A52A2-628D-41AC-8D8D-9349A46921A5}" type="datetimeFigureOut">
               <a:rPr lang="zh-TW" altLang="en-US" smtClean="0"/>
-              <a:t>2020/6/3</a:t>
+              <a:t>2020/6/8</a:t>
             </a:fld>
             <a:endParaRPr lang="zh-TW" altLang="en-US"/>
           </a:p>
@@ -2364,7 +2360,7 @@
           <a:p>
             <a:fld id="{926A52A2-628D-41AC-8D8D-9349A46921A5}" type="datetimeFigureOut">
               <a:rPr lang="zh-TW" altLang="en-US" smtClean="0"/>
-              <a:t>2020/6/3</a:t>
+              <a:t>2020/6/8</a:t>
             </a:fld>
             <a:endParaRPr lang="zh-TW" altLang="en-US"/>
           </a:p>
@@ -2595,7 +2591,7 @@
           <a:p>
             <a:fld id="{926A52A2-628D-41AC-8D8D-9349A46921A5}" type="datetimeFigureOut">
               <a:rPr lang="zh-TW" altLang="en-US" smtClean="0"/>
-              <a:t>2020/6/3</a:t>
+              <a:t>2020/6/8</a:t>
             </a:fld>
             <a:endParaRPr lang="zh-TW" altLang="en-US"/>
           </a:p>
@@ -3120,6 +3116,518 @@
       </p:grpSpPr>
       <p:sp>
         <p:nvSpPr>
+          <p:cNvPr id="2" name="文字方塊 1"/>
+          <p:cNvSpPr txBox="1"/>
+          <p:nvPr/>
+        </p:nvSpPr>
+        <p:spPr>
+          <a:xfrm>
+            <a:off x="3214256" y="2438400"/>
+            <a:ext cx="5482591" cy="1323439"/>
+          </a:xfrm>
+          <a:prstGeom prst="rect">
+            <a:avLst/>
+          </a:prstGeom>
+          <a:noFill/>
+        </p:spPr>
+        <p:txBody>
+          <a:bodyPr wrap="none" rtlCol="0">
+            <a:spAutoFit/>
+          </a:bodyPr>
+          <a:lstStyle/>
+          <a:p>
+            <a:r>
+              <a:rPr lang="en-US" altLang="zh-TW" sz="8000" b="1" dirty="0" smtClean="0">
+                <a:latin typeface="Taipei Sans TC Beta" pitchFamily="2" charset="-120"/>
+                <a:ea typeface="Taipei Sans TC Beta" pitchFamily="2" charset="-120"/>
+              </a:rPr>
+              <a:t>Thank you</a:t>
+            </a:r>
+            <a:endParaRPr lang="zh-TW" altLang="en-US" sz="8000" b="1" dirty="0">
+              <a:latin typeface="Taipei Sans TC Beta" pitchFamily="2" charset="-120"/>
+              <a:ea typeface="Taipei Sans TC Beta" pitchFamily="2" charset="-120"/>
+            </a:endParaRPr>
+          </a:p>
+        </p:txBody>
+      </p:sp>
+    </p:spTree>
+    <p:extLst>
+      <p:ext uri="{BB962C8B-B14F-4D97-AF65-F5344CB8AC3E}">
+        <p14:creationId xmlns:p14="http://schemas.microsoft.com/office/powerpoint/2010/main" val="1465074021"/>
+      </p:ext>
+    </p:extLst>
+  </p:cSld>
+  <p:clrMapOvr>
+    <a:masterClrMapping/>
+  </p:clrMapOvr>
+</p:sld>
+</file>
+
+<file path=ppt/slides/slide2.xml><?xml version="1.0" encoding="utf-8"?>
+<p:sld xmlns:a="http://schemas.openxmlformats.org/drawingml/2006/main" xmlns:r="http://schemas.openxmlformats.org/officeDocument/2006/relationships" xmlns:p="http://schemas.openxmlformats.org/presentationml/2006/main">
+  <p:cSld>
+    <p:spTree>
+      <p:nvGrpSpPr>
+        <p:cNvPr id="1" name=""/>
+        <p:cNvGrpSpPr/>
+        <p:nvPr/>
+      </p:nvGrpSpPr>
+      <p:grpSpPr>
+        <a:xfrm>
+          <a:off x="0" y="0"/>
+          <a:ext cx="0" cy="0"/>
+          <a:chOff x="0" y="0"/>
+          <a:chExt cx="0" cy="0"/>
+        </a:xfrm>
+      </p:grpSpPr>
+      <p:pic>
+        <p:nvPicPr>
+          <p:cNvPr id="2" name="圖片 1"/>
+          <p:cNvPicPr>
+            <a:picLocks noChangeAspect="1"/>
+          </p:cNvPicPr>
+          <p:nvPr/>
+        </p:nvPicPr>
+        <p:blipFill>
+          <a:blip r:embed="rId2">
+            <a:extLst>
+              <a:ext uri="{28A0092B-C50C-407E-A947-70E740481C1C}">
+                <a14:useLocalDpi xmlns:a14="http://schemas.microsoft.com/office/drawing/2010/main" val="0"/>
+              </a:ext>
+            </a:extLst>
+          </a:blip>
+          <a:stretch>
+            <a:fillRect/>
+          </a:stretch>
+        </p:blipFill>
+        <p:spPr>
+          <a:xfrm>
+            <a:off x="1954770" y="1633397"/>
+            <a:ext cx="8307185" cy="4672792"/>
+          </a:xfrm>
+          <a:prstGeom prst="rect">
+            <a:avLst/>
+          </a:prstGeom>
+        </p:spPr>
+      </p:pic>
+      <p:sp>
+        <p:nvSpPr>
+          <p:cNvPr id="3" name="矩形 2"/>
+          <p:cNvSpPr/>
+          <p:nvPr/>
+        </p:nvSpPr>
+        <p:spPr>
+          <a:xfrm>
+            <a:off x="5108940" y="6306189"/>
+            <a:ext cx="2195794" cy="369332"/>
+          </a:xfrm>
+          <a:prstGeom prst="rect">
+            <a:avLst/>
+          </a:prstGeom>
+        </p:spPr>
+        <p:txBody>
+          <a:bodyPr wrap="none">
+            <a:spAutoFit/>
+          </a:bodyPr>
+          <a:lstStyle/>
+          <a:p>
+            <a:r>
+              <a:rPr lang="zh-TW" altLang="en-US" dirty="0" smtClean="0"/>
+              <a:t>PhysRevA.81.042311</a:t>
+            </a:r>
+            <a:endParaRPr lang="zh-TW" altLang="en-US" dirty="0"/>
+          </a:p>
+        </p:txBody>
+      </p:sp>
+      <p:pic>
+        <p:nvPicPr>
+          <p:cNvPr id="1034" name="Picture 10" descr="http://latex2png.com/pngs/805a9c5843d71e8c06e136b5a5596694.png"/>
+          <p:cNvPicPr>
+            <a:picLocks noChangeAspect="1" noChangeArrowheads="1"/>
+          </p:cNvPicPr>
+          <p:nvPr/>
+        </p:nvPicPr>
+        <p:blipFill>
+          <a:blip r:embed="rId3">
+            <a:extLst>
+              <a:ext uri="{28A0092B-C50C-407E-A947-70E740481C1C}">
+                <a14:useLocalDpi xmlns:a14="http://schemas.microsoft.com/office/drawing/2010/main" val="0"/>
+              </a:ext>
+            </a:extLst>
+          </a:blip>
+          <a:srcRect/>
+          <a:stretch>
+            <a:fillRect/>
+          </a:stretch>
+        </p:blipFill>
+        <p:spPr bwMode="auto">
+          <a:xfrm>
+            <a:off x="1125805" y="136175"/>
+            <a:ext cx="10162064" cy="1297770"/>
+          </a:xfrm>
+          <a:prstGeom prst="rect">
+            <a:avLst/>
+          </a:prstGeom>
+          <a:noFill/>
+          <a:extLst>
+            <a:ext uri="{909E8E84-426E-40DD-AFC4-6F175D3DCCD1}">
+              <a14:hiddenFill xmlns:a14="http://schemas.microsoft.com/office/drawing/2010/main">
+                <a:solidFill>
+                  <a:srgbClr val="FFFFFF"/>
+                </a:solidFill>
+              </a14:hiddenFill>
+            </a:ext>
+          </a:extLst>
+        </p:spPr>
+      </p:pic>
+    </p:spTree>
+    <p:extLst>
+      <p:ext uri="{BB962C8B-B14F-4D97-AF65-F5344CB8AC3E}">
+        <p14:creationId xmlns:p14="http://schemas.microsoft.com/office/powerpoint/2010/main" val="1682265342"/>
+      </p:ext>
+    </p:extLst>
+  </p:cSld>
+  <p:clrMapOvr>
+    <a:masterClrMapping/>
+  </p:clrMapOvr>
+  <p:timing>
+    <p:tnLst>
+      <p:par>
+        <p:cTn id="1" dur="indefinite" restart="never" nodeType="tmRoot"/>
+      </p:par>
+    </p:tnLst>
+  </p:timing>
+</p:sld>
+</file>
+
+<file path=ppt/slides/slide3.xml><?xml version="1.0" encoding="utf-8"?>
+<p:sld xmlns:a="http://schemas.openxmlformats.org/drawingml/2006/main" xmlns:r="http://schemas.openxmlformats.org/officeDocument/2006/relationships" xmlns:p="http://schemas.openxmlformats.org/presentationml/2006/main">
+  <p:cSld>
+    <p:spTree>
+      <p:nvGrpSpPr>
+        <p:cNvPr id="1" name=""/>
+        <p:cNvGrpSpPr/>
+        <p:nvPr/>
+      </p:nvGrpSpPr>
+      <p:grpSpPr>
+        <a:xfrm>
+          <a:off x="0" y="0"/>
+          <a:ext cx="0" cy="0"/>
+          <a:chOff x="0" y="0"/>
+          <a:chExt cx="0" cy="0"/>
+        </a:xfrm>
+      </p:grpSpPr>
+      <p:grpSp>
+        <p:nvGrpSpPr>
+          <p:cNvPr id="15" name="群組 14"/>
+          <p:cNvGrpSpPr/>
+          <p:nvPr/>
+        </p:nvGrpSpPr>
+        <p:grpSpPr>
+          <a:xfrm>
+            <a:off x="3177740" y="87868"/>
+            <a:ext cx="6400800" cy="6400800"/>
+            <a:chOff x="3614112" y="87868"/>
+            <a:chExt cx="6400800" cy="6400800"/>
+          </a:xfrm>
+        </p:grpSpPr>
+        <p:pic>
+          <p:nvPicPr>
+            <p:cNvPr id="9" name="圖片 8"/>
+            <p:cNvPicPr>
+              <a:picLocks/>
+            </p:cNvPicPr>
+            <p:nvPr/>
+          </p:nvPicPr>
+          <p:blipFill>
+            <a:blip r:embed="rId2" cstate="print">
+              <a:extLst>
+                <a:ext uri="{28A0092B-C50C-407E-A947-70E740481C1C}">
+                  <a14:useLocalDpi xmlns:a14="http://schemas.microsoft.com/office/drawing/2010/main" val="0"/>
+                </a:ext>
+              </a:extLst>
+            </a:blip>
+            <a:stretch>
+              <a:fillRect/>
+            </a:stretch>
+          </p:blipFill>
+          <p:spPr>
+            <a:xfrm>
+              <a:off x="3614112" y="87868"/>
+              <a:ext cx="3200400" cy="6400800"/>
+            </a:xfrm>
+            <a:prstGeom prst="rect">
+              <a:avLst/>
+            </a:prstGeom>
+          </p:spPr>
+        </p:pic>
+        <p:pic>
+          <p:nvPicPr>
+            <p:cNvPr id="11" name="圖片 10"/>
+            <p:cNvPicPr>
+              <a:picLocks noChangeAspect="1"/>
+            </p:cNvPicPr>
+            <p:nvPr/>
+          </p:nvPicPr>
+          <p:blipFill>
+            <a:blip r:embed="rId3">
+              <a:extLst>
+                <a:ext uri="{28A0092B-C50C-407E-A947-70E740481C1C}">
+                  <a14:useLocalDpi xmlns:a14="http://schemas.microsoft.com/office/drawing/2010/main" val="0"/>
+                </a:ext>
+              </a:extLst>
+            </a:blip>
+            <a:stretch>
+              <a:fillRect/>
+            </a:stretch>
+          </p:blipFill>
+          <p:spPr>
+            <a:xfrm>
+              <a:off x="6814512" y="3288268"/>
+              <a:ext cx="3200400" cy="3200400"/>
+            </a:xfrm>
+            <a:prstGeom prst="rect">
+              <a:avLst/>
+            </a:prstGeom>
+          </p:spPr>
+        </p:pic>
+        <p:pic>
+          <p:nvPicPr>
+            <p:cNvPr id="14" name="圖片 13"/>
+            <p:cNvPicPr>
+              <a:picLocks noChangeAspect="1"/>
+            </p:cNvPicPr>
+            <p:nvPr/>
+          </p:nvPicPr>
+          <p:blipFill>
+            <a:blip r:embed="rId4" cstate="print">
+              <a:extLst>
+                <a:ext uri="{28A0092B-C50C-407E-A947-70E740481C1C}">
+                  <a14:useLocalDpi xmlns:a14="http://schemas.microsoft.com/office/drawing/2010/main" val="0"/>
+                </a:ext>
+              </a:extLst>
+            </a:blip>
+            <a:stretch>
+              <a:fillRect/>
+            </a:stretch>
+          </p:blipFill>
+          <p:spPr>
+            <a:xfrm>
+              <a:off x="6814512" y="87868"/>
+              <a:ext cx="3200400" cy="3200400"/>
+            </a:xfrm>
+            <a:prstGeom prst="rect">
+              <a:avLst/>
+            </a:prstGeom>
+          </p:spPr>
+        </p:pic>
+      </p:grpSp>
+      <p:sp>
+        <p:nvSpPr>
+          <p:cNvPr id="16" name="矩形 15"/>
+          <p:cNvSpPr/>
+          <p:nvPr/>
+        </p:nvSpPr>
+        <p:spPr>
+          <a:xfrm>
+            <a:off x="5107631" y="6488668"/>
+            <a:ext cx="2541017" cy="369332"/>
+          </a:xfrm>
+          <a:prstGeom prst="rect">
+            <a:avLst/>
+          </a:prstGeom>
+        </p:spPr>
+        <p:txBody>
+          <a:bodyPr wrap="none">
+            <a:spAutoFit/>
+          </a:bodyPr>
+          <a:lstStyle/>
+          <a:p>
+            <a:r>
+              <a:rPr lang="zh-TW" altLang="en-US" dirty="0"/>
+              <a:t>PhysRevLett.114.</a:t>
+            </a:r>
+            <a:r>
+              <a:rPr lang="zh-TW" altLang="en-US" dirty="0" smtClean="0"/>
+              <a:t>233601</a:t>
+            </a:r>
+            <a:endParaRPr lang="zh-TW" altLang="en-US" dirty="0"/>
+          </a:p>
+        </p:txBody>
+      </p:sp>
+    </p:spTree>
+    <p:extLst>
+      <p:ext uri="{BB962C8B-B14F-4D97-AF65-F5344CB8AC3E}">
+        <p14:creationId xmlns:p14="http://schemas.microsoft.com/office/powerpoint/2010/main" val="153568292"/>
+      </p:ext>
+    </p:extLst>
+  </p:cSld>
+  <p:clrMapOvr>
+    <a:masterClrMapping/>
+  </p:clrMapOvr>
+  <p:timing>
+    <p:tnLst>
+      <p:par>
+        <p:cTn id="1" dur="indefinite" restart="never" nodeType="tmRoot"/>
+      </p:par>
+    </p:tnLst>
+  </p:timing>
+</p:sld>
+</file>
+
+<file path=ppt/slides/slide4.xml><?xml version="1.0" encoding="utf-8"?>
+<p:sld xmlns:a="http://schemas.openxmlformats.org/drawingml/2006/main" xmlns:r="http://schemas.openxmlformats.org/officeDocument/2006/relationships" xmlns:p="http://schemas.openxmlformats.org/presentationml/2006/main">
+  <p:cSld>
+    <p:spTree>
+      <p:nvGrpSpPr>
+        <p:cNvPr id="1" name=""/>
+        <p:cNvGrpSpPr/>
+        <p:nvPr/>
+      </p:nvGrpSpPr>
+      <p:grpSpPr>
+        <a:xfrm>
+          <a:off x="0" y="0"/>
+          <a:ext cx="0" cy="0"/>
+          <a:chOff x="0" y="0"/>
+          <a:chExt cx="0" cy="0"/>
+        </a:xfrm>
+      </p:grpSpPr>
+      <p:pic>
+        <p:nvPicPr>
+          <p:cNvPr id="2" name="圖片 1"/>
+          <p:cNvPicPr>
+            <a:picLocks noChangeAspect="1"/>
+          </p:cNvPicPr>
+          <p:nvPr/>
+        </p:nvPicPr>
+        <p:blipFill>
+          <a:blip r:embed="rId2" cstate="print">
+            <a:extLst>
+              <a:ext uri="{28A0092B-C50C-407E-A947-70E740481C1C}">
+                <a14:useLocalDpi xmlns:a14="http://schemas.microsoft.com/office/drawing/2010/main" val="0"/>
+              </a:ext>
+            </a:extLst>
+          </a:blip>
+          <a:stretch>
+            <a:fillRect/>
+          </a:stretch>
+        </p:blipFill>
+        <p:spPr>
+          <a:xfrm>
+            <a:off x="1985962" y="280987"/>
+            <a:ext cx="8476487" cy="5650992"/>
+          </a:xfrm>
+          <a:prstGeom prst="rect">
+            <a:avLst/>
+          </a:prstGeom>
+        </p:spPr>
+      </p:pic>
+    </p:spTree>
+    <p:extLst>
+      <p:ext uri="{BB962C8B-B14F-4D97-AF65-F5344CB8AC3E}">
+        <p14:creationId xmlns:p14="http://schemas.microsoft.com/office/powerpoint/2010/main" val="2328048421"/>
+      </p:ext>
+    </p:extLst>
+  </p:cSld>
+  <p:clrMapOvr>
+    <a:masterClrMapping/>
+  </p:clrMapOvr>
+  <p:timing>
+    <p:tnLst>
+      <p:par>
+        <p:cTn id="1" dur="indefinite" restart="never" nodeType="tmRoot"/>
+      </p:par>
+    </p:tnLst>
+  </p:timing>
+</p:sld>
+</file>
+
+<file path=ppt/slides/slide5.xml><?xml version="1.0" encoding="utf-8"?>
+<p:sld xmlns:a="http://schemas.openxmlformats.org/drawingml/2006/main" xmlns:r="http://schemas.openxmlformats.org/officeDocument/2006/relationships" xmlns:p="http://schemas.openxmlformats.org/presentationml/2006/main">
+  <p:cSld>
+    <p:spTree>
+      <p:nvGrpSpPr>
+        <p:cNvPr id="1" name=""/>
+        <p:cNvGrpSpPr/>
+        <p:nvPr/>
+      </p:nvGrpSpPr>
+      <p:grpSpPr>
+        <a:xfrm>
+          <a:off x="0" y="0"/>
+          <a:ext cx="0" cy="0"/>
+          <a:chOff x="0" y="0"/>
+          <a:chExt cx="0" cy="0"/>
+        </a:xfrm>
+      </p:grpSpPr>
+      <p:pic>
+        <p:nvPicPr>
+          <p:cNvPr id="2" name="圖片 1"/>
+          <p:cNvPicPr>
+            <a:picLocks noChangeAspect="1"/>
+          </p:cNvPicPr>
+          <p:nvPr/>
+        </p:nvPicPr>
+        <p:blipFill>
+          <a:blip r:embed="rId2" cstate="print">
+            <a:extLst>
+              <a:ext uri="{28A0092B-C50C-407E-A947-70E740481C1C}">
+                <a14:useLocalDpi xmlns:a14="http://schemas.microsoft.com/office/drawing/2010/main" val="0"/>
+              </a:ext>
+            </a:extLst>
+          </a:blip>
+          <a:stretch>
+            <a:fillRect/>
+          </a:stretch>
+        </p:blipFill>
+        <p:spPr>
+          <a:xfrm>
+            <a:off x="1800225" y="233507"/>
+            <a:ext cx="8479412" cy="5652941"/>
+          </a:xfrm>
+          <a:prstGeom prst="rect">
+            <a:avLst/>
+          </a:prstGeom>
+        </p:spPr>
+      </p:pic>
+    </p:spTree>
+    <p:extLst>
+      <p:ext uri="{BB962C8B-B14F-4D97-AF65-F5344CB8AC3E}">
+        <p14:creationId xmlns:p14="http://schemas.microsoft.com/office/powerpoint/2010/main" val="1640291520"/>
+      </p:ext>
+    </p:extLst>
+  </p:cSld>
+  <p:clrMapOvr>
+    <a:masterClrMapping/>
+  </p:clrMapOvr>
+  <p:timing>
+    <p:tnLst>
+      <p:par>
+        <p:cTn id="1" dur="indefinite" restart="never" nodeType="tmRoot"/>
+      </p:par>
+    </p:tnLst>
+  </p:timing>
+</p:sld>
+</file>
+
+<file path=ppt/slides/slide6.xml><?xml version="1.0" encoding="utf-8"?>
+<p:sld xmlns:a="http://schemas.openxmlformats.org/drawingml/2006/main" xmlns:r="http://schemas.openxmlformats.org/officeDocument/2006/relationships" xmlns:p="http://schemas.openxmlformats.org/presentationml/2006/main">
+  <p:cSld>
+    <p:spTree>
+      <p:nvGrpSpPr>
+        <p:cNvPr id="1" name=""/>
+        <p:cNvGrpSpPr/>
+        <p:nvPr/>
+      </p:nvGrpSpPr>
+      <p:grpSpPr>
+        <a:xfrm>
+          <a:off x="0" y="0"/>
+          <a:ext cx="0" cy="0"/>
+          <a:chOff x="0" y="0"/>
+          <a:chExt cx="0" cy="0"/>
+        </a:xfrm>
+      </p:grpSpPr>
+      <p:sp>
+        <p:nvSpPr>
           <p:cNvPr id="7" name="矩形 6"/>
           <p:cNvSpPr/>
           <p:nvPr/>
@@ -3287,7 +3795,7 @@
 </p:sld>
 </file>
 
-<file path=ppt/slides/slide11.xml><?xml version="1.0" encoding="utf-8"?>
+<file path=ppt/slides/slide7.xml><?xml version="1.0" encoding="utf-8"?>
 <p:sld xmlns:a="http://schemas.openxmlformats.org/drawingml/2006/main" xmlns:r="http://schemas.openxmlformats.org/officeDocument/2006/relationships" xmlns:p="http://schemas.openxmlformats.org/presentationml/2006/main">
   <p:cSld>
     <p:spTree>
@@ -3474,7 +3982,7 @@
 </p:sld>
 </file>
 
-<file path=ppt/slides/slide12.xml><?xml version="1.0" encoding="utf-8"?>
+<file path=ppt/slides/slide8.xml><?xml version="1.0" encoding="utf-8"?>
 <p:sld xmlns:a="http://schemas.openxmlformats.org/drawingml/2006/main" xmlns:r="http://schemas.openxmlformats.org/officeDocument/2006/relationships" xmlns:p="http://schemas.openxmlformats.org/presentationml/2006/main">
   <p:cSld>
     <p:spTree>
@@ -3750,7 +4258,7 @@
 </p:sld>
 </file>
 
-<file path=ppt/slides/slide13.xml><?xml version="1.0" encoding="utf-8"?>
+<file path=ppt/slides/slide9.xml><?xml version="1.0" encoding="utf-8"?>
 <p:sld xmlns:a="http://schemas.openxmlformats.org/drawingml/2006/main" xmlns:r="http://schemas.openxmlformats.org/officeDocument/2006/relationships" xmlns:p="http://schemas.openxmlformats.org/presentationml/2006/main">
   <p:cSld>
     <p:spTree>
@@ -3906,873 +4414,6 @@
     <p:extLst>
       <p:ext uri="{BB962C8B-B14F-4D97-AF65-F5344CB8AC3E}">
         <p14:creationId xmlns:p14="http://schemas.microsoft.com/office/powerpoint/2010/main" val="2043972612"/>
-      </p:ext>
-    </p:extLst>
-  </p:cSld>
-  <p:clrMapOvr>
-    <a:masterClrMapping/>
-  </p:clrMapOvr>
-  <p:timing>
-    <p:tnLst>
-      <p:par>
-        <p:cTn id="1" dur="indefinite" restart="never" nodeType="tmRoot"/>
-      </p:par>
-    </p:tnLst>
-  </p:timing>
-</p:sld>
-</file>
-
-<file path=ppt/slides/slide14.xml><?xml version="1.0" encoding="utf-8"?>
-<p:sld xmlns:a="http://schemas.openxmlformats.org/drawingml/2006/main" xmlns:r="http://schemas.openxmlformats.org/officeDocument/2006/relationships" xmlns:p="http://schemas.openxmlformats.org/presentationml/2006/main">
-  <p:cSld>
-    <p:spTree>
-      <p:nvGrpSpPr>
-        <p:cNvPr id="1" name=""/>
-        <p:cNvGrpSpPr/>
-        <p:nvPr/>
-      </p:nvGrpSpPr>
-      <p:grpSpPr>
-        <a:xfrm>
-          <a:off x="0" y="0"/>
-          <a:ext cx="0" cy="0"/>
-          <a:chOff x="0" y="0"/>
-          <a:chExt cx="0" cy="0"/>
-        </a:xfrm>
-      </p:grpSpPr>
-      <p:sp>
-        <p:nvSpPr>
-          <p:cNvPr id="2" name="文字方塊 1"/>
-          <p:cNvSpPr txBox="1"/>
-          <p:nvPr/>
-        </p:nvSpPr>
-        <p:spPr>
-          <a:xfrm>
-            <a:off x="3214256" y="2438400"/>
-            <a:ext cx="5482591" cy="1323439"/>
-          </a:xfrm>
-          <a:prstGeom prst="rect">
-            <a:avLst/>
-          </a:prstGeom>
-          <a:noFill/>
-        </p:spPr>
-        <p:txBody>
-          <a:bodyPr wrap="none" rtlCol="0">
-            <a:spAutoFit/>
-          </a:bodyPr>
-          <a:lstStyle/>
-          <a:p>
-            <a:r>
-              <a:rPr lang="en-US" altLang="zh-TW" sz="8000" b="1" dirty="0" smtClean="0">
-                <a:latin typeface="Taipei Sans TC Beta" pitchFamily="2" charset="-120"/>
-                <a:ea typeface="Taipei Sans TC Beta" pitchFamily="2" charset="-120"/>
-              </a:rPr>
-              <a:t>Thank you</a:t>
-            </a:r>
-            <a:endParaRPr lang="zh-TW" altLang="en-US" sz="8000" b="1" dirty="0">
-              <a:latin typeface="Taipei Sans TC Beta" pitchFamily="2" charset="-120"/>
-              <a:ea typeface="Taipei Sans TC Beta" pitchFamily="2" charset="-120"/>
-            </a:endParaRPr>
-          </a:p>
-        </p:txBody>
-      </p:sp>
-    </p:spTree>
-    <p:extLst>
-      <p:ext uri="{BB962C8B-B14F-4D97-AF65-F5344CB8AC3E}">
-        <p14:creationId xmlns:p14="http://schemas.microsoft.com/office/powerpoint/2010/main" val="1465074021"/>
-      </p:ext>
-    </p:extLst>
-  </p:cSld>
-  <p:clrMapOvr>
-    <a:masterClrMapping/>
-  </p:clrMapOvr>
-</p:sld>
-</file>
-
-<file path=ppt/slides/slide2.xml><?xml version="1.0" encoding="utf-8"?>
-<p:sld xmlns:a="http://schemas.openxmlformats.org/drawingml/2006/main" xmlns:r="http://schemas.openxmlformats.org/officeDocument/2006/relationships" xmlns:p="http://schemas.openxmlformats.org/presentationml/2006/main">
-  <p:cSld>
-    <p:spTree>
-      <p:nvGrpSpPr>
-        <p:cNvPr id="1" name=""/>
-        <p:cNvGrpSpPr/>
-        <p:nvPr/>
-      </p:nvGrpSpPr>
-      <p:grpSpPr>
-        <a:xfrm>
-          <a:off x="0" y="0"/>
-          <a:ext cx="0" cy="0"/>
-          <a:chOff x="0" y="0"/>
-          <a:chExt cx="0" cy="0"/>
-        </a:xfrm>
-      </p:grpSpPr>
-      <p:pic>
-        <p:nvPicPr>
-          <p:cNvPr id="2" name="圖片 1"/>
-          <p:cNvPicPr>
-            <a:picLocks noChangeAspect="1"/>
-          </p:cNvPicPr>
-          <p:nvPr/>
-        </p:nvPicPr>
-        <p:blipFill>
-          <a:blip r:embed="rId2">
-            <a:extLst>
-              <a:ext uri="{28A0092B-C50C-407E-A947-70E740481C1C}">
-                <a14:useLocalDpi xmlns:a14="http://schemas.microsoft.com/office/drawing/2010/main" val="0"/>
-              </a:ext>
-            </a:extLst>
-          </a:blip>
-          <a:stretch>
-            <a:fillRect/>
-          </a:stretch>
-        </p:blipFill>
-        <p:spPr>
-          <a:xfrm>
-            <a:off x="1954770" y="1633397"/>
-            <a:ext cx="8307185" cy="4672792"/>
-          </a:xfrm>
-          <a:prstGeom prst="rect">
-            <a:avLst/>
-          </a:prstGeom>
-        </p:spPr>
-      </p:pic>
-      <p:sp>
-        <p:nvSpPr>
-          <p:cNvPr id="3" name="矩形 2"/>
-          <p:cNvSpPr/>
-          <p:nvPr/>
-        </p:nvSpPr>
-        <p:spPr>
-          <a:xfrm>
-            <a:off x="5108940" y="6306189"/>
-            <a:ext cx="2195794" cy="369332"/>
-          </a:xfrm>
-          <a:prstGeom prst="rect">
-            <a:avLst/>
-          </a:prstGeom>
-        </p:spPr>
-        <p:txBody>
-          <a:bodyPr wrap="none">
-            <a:spAutoFit/>
-          </a:bodyPr>
-          <a:lstStyle/>
-          <a:p>
-            <a:r>
-              <a:rPr lang="zh-TW" altLang="en-US" dirty="0" smtClean="0"/>
-              <a:t>PhysRevA.81.042311</a:t>
-            </a:r>
-            <a:endParaRPr lang="zh-TW" altLang="en-US" dirty="0"/>
-          </a:p>
-        </p:txBody>
-      </p:sp>
-      <p:pic>
-        <p:nvPicPr>
-          <p:cNvPr id="1034" name="Picture 10" descr="http://latex2png.com/pngs/805a9c5843d71e8c06e136b5a5596694.png"/>
-          <p:cNvPicPr>
-            <a:picLocks noChangeAspect="1" noChangeArrowheads="1"/>
-          </p:cNvPicPr>
-          <p:nvPr/>
-        </p:nvPicPr>
-        <p:blipFill>
-          <a:blip r:embed="rId3">
-            <a:extLst>
-              <a:ext uri="{28A0092B-C50C-407E-A947-70E740481C1C}">
-                <a14:useLocalDpi xmlns:a14="http://schemas.microsoft.com/office/drawing/2010/main" val="0"/>
-              </a:ext>
-            </a:extLst>
-          </a:blip>
-          <a:srcRect/>
-          <a:stretch>
-            <a:fillRect/>
-          </a:stretch>
-        </p:blipFill>
-        <p:spPr bwMode="auto">
-          <a:xfrm>
-            <a:off x="1125805" y="136175"/>
-            <a:ext cx="10162064" cy="1297770"/>
-          </a:xfrm>
-          <a:prstGeom prst="rect">
-            <a:avLst/>
-          </a:prstGeom>
-          <a:noFill/>
-          <a:extLst>
-            <a:ext uri="{909E8E84-426E-40DD-AFC4-6F175D3DCCD1}">
-              <a14:hiddenFill xmlns:a14="http://schemas.microsoft.com/office/drawing/2010/main">
-                <a:solidFill>
-                  <a:srgbClr val="FFFFFF"/>
-                </a:solidFill>
-              </a14:hiddenFill>
-            </a:ext>
-          </a:extLst>
-        </p:spPr>
-      </p:pic>
-    </p:spTree>
-    <p:extLst>
-      <p:ext uri="{BB962C8B-B14F-4D97-AF65-F5344CB8AC3E}">
-        <p14:creationId xmlns:p14="http://schemas.microsoft.com/office/powerpoint/2010/main" val="1682265342"/>
-      </p:ext>
-    </p:extLst>
-  </p:cSld>
-  <p:clrMapOvr>
-    <a:masterClrMapping/>
-  </p:clrMapOvr>
-  <p:timing>
-    <p:tnLst>
-      <p:par>
-        <p:cTn id="1" dur="indefinite" restart="never" nodeType="tmRoot"/>
-      </p:par>
-    </p:tnLst>
-  </p:timing>
-</p:sld>
-</file>
-
-<file path=ppt/slides/slide3.xml><?xml version="1.0" encoding="utf-8"?>
-<p:sld xmlns:a="http://schemas.openxmlformats.org/drawingml/2006/main" xmlns:r="http://schemas.openxmlformats.org/officeDocument/2006/relationships" xmlns:p="http://schemas.openxmlformats.org/presentationml/2006/main">
-  <p:cSld>
-    <p:spTree>
-      <p:nvGrpSpPr>
-        <p:cNvPr id="1" name=""/>
-        <p:cNvGrpSpPr/>
-        <p:nvPr/>
-      </p:nvGrpSpPr>
-      <p:grpSpPr>
-        <a:xfrm>
-          <a:off x="0" y="0"/>
-          <a:ext cx="0" cy="0"/>
-          <a:chOff x="0" y="0"/>
-          <a:chExt cx="0" cy="0"/>
-        </a:xfrm>
-      </p:grpSpPr>
-      <p:grpSp>
-        <p:nvGrpSpPr>
-          <p:cNvPr id="15" name="群組 14"/>
-          <p:cNvGrpSpPr/>
-          <p:nvPr/>
-        </p:nvGrpSpPr>
-        <p:grpSpPr>
-          <a:xfrm>
-            <a:off x="3177740" y="87868"/>
-            <a:ext cx="6400800" cy="6400800"/>
-            <a:chOff x="3614112" y="87868"/>
-            <a:chExt cx="6400800" cy="6400800"/>
-          </a:xfrm>
-        </p:grpSpPr>
-        <p:pic>
-          <p:nvPicPr>
-            <p:cNvPr id="9" name="圖片 8"/>
-            <p:cNvPicPr>
-              <a:picLocks/>
-            </p:cNvPicPr>
-            <p:nvPr/>
-          </p:nvPicPr>
-          <p:blipFill>
-            <a:blip r:embed="rId2" cstate="print">
-              <a:extLst>
-                <a:ext uri="{28A0092B-C50C-407E-A947-70E740481C1C}">
-                  <a14:useLocalDpi xmlns:a14="http://schemas.microsoft.com/office/drawing/2010/main" val="0"/>
-                </a:ext>
-              </a:extLst>
-            </a:blip>
-            <a:stretch>
-              <a:fillRect/>
-            </a:stretch>
-          </p:blipFill>
-          <p:spPr>
-            <a:xfrm>
-              <a:off x="3614112" y="87868"/>
-              <a:ext cx="3200400" cy="6400800"/>
-            </a:xfrm>
-            <a:prstGeom prst="rect">
-              <a:avLst/>
-            </a:prstGeom>
-          </p:spPr>
-        </p:pic>
-        <p:pic>
-          <p:nvPicPr>
-            <p:cNvPr id="11" name="圖片 10"/>
-            <p:cNvPicPr>
-              <a:picLocks noChangeAspect="1"/>
-            </p:cNvPicPr>
-            <p:nvPr/>
-          </p:nvPicPr>
-          <p:blipFill>
-            <a:blip r:embed="rId3">
-              <a:extLst>
-                <a:ext uri="{28A0092B-C50C-407E-A947-70E740481C1C}">
-                  <a14:useLocalDpi xmlns:a14="http://schemas.microsoft.com/office/drawing/2010/main" val="0"/>
-                </a:ext>
-              </a:extLst>
-            </a:blip>
-            <a:stretch>
-              <a:fillRect/>
-            </a:stretch>
-          </p:blipFill>
-          <p:spPr>
-            <a:xfrm>
-              <a:off x="6814512" y="3288268"/>
-              <a:ext cx="3200400" cy="3200400"/>
-            </a:xfrm>
-            <a:prstGeom prst="rect">
-              <a:avLst/>
-            </a:prstGeom>
-          </p:spPr>
-        </p:pic>
-        <p:pic>
-          <p:nvPicPr>
-            <p:cNvPr id="14" name="圖片 13"/>
-            <p:cNvPicPr>
-              <a:picLocks noChangeAspect="1"/>
-            </p:cNvPicPr>
-            <p:nvPr/>
-          </p:nvPicPr>
-          <p:blipFill>
-            <a:blip r:embed="rId4" cstate="print">
-              <a:extLst>
-                <a:ext uri="{28A0092B-C50C-407E-A947-70E740481C1C}">
-                  <a14:useLocalDpi xmlns:a14="http://schemas.microsoft.com/office/drawing/2010/main" val="0"/>
-                </a:ext>
-              </a:extLst>
-            </a:blip>
-            <a:stretch>
-              <a:fillRect/>
-            </a:stretch>
-          </p:blipFill>
-          <p:spPr>
-            <a:xfrm>
-              <a:off x="6814512" y="87868"/>
-              <a:ext cx="3200400" cy="3200400"/>
-            </a:xfrm>
-            <a:prstGeom prst="rect">
-              <a:avLst/>
-            </a:prstGeom>
-          </p:spPr>
-        </p:pic>
-      </p:grpSp>
-      <p:sp>
-        <p:nvSpPr>
-          <p:cNvPr id="16" name="矩形 15"/>
-          <p:cNvSpPr/>
-          <p:nvPr/>
-        </p:nvSpPr>
-        <p:spPr>
-          <a:xfrm>
-            <a:off x="5107631" y="6488668"/>
-            <a:ext cx="2541017" cy="369332"/>
-          </a:xfrm>
-          <a:prstGeom prst="rect">
-            <a:avLst/>
-          </a:prstGeom>
-        </p:spPr>
-        <p:txBody>
-          <a:bodyPr wrap="none">
-            <a:spAutoFit/>
-          </a:bodyPr>
-          <a:lstStyle/>
-          <a:p>
-            <a:r>
-              <a:rPr lang="zh-TW" altLang="en-US" dirty="0"/>
-              <a:t>PhysRevLett.114.</a:t>
-            </a:r>
-            <a:r>
-              <a:rPr lang="zh-TW" altLang="en-US" dirty="0" smtClean="0"/>
-              <a:t>233601</a:t>
-            </a:r>
-            <a:endParaRPr lang="zh-TW" altLang="en-US" dirty="0"/>
-          </a:p>
-        </p:txBody>
-      </p:sp>
-    </p:spTree>
-    <p:extLst>
-      <p:ext uri="{BB962C8B-B14F-4D97-AF65-F5344CB8AC3E}">
-        <p14:creationId xmlns:p14="http://schemas.microsoft.com/office/powerpoint/2010/main" val="153568292"/>
-      </p:ext>
-    </p:extLst>
-  </p:cSld>
-  <p:clrMapOvr>
-    <a:masterClrMapping/>
-  </p:clrMapOvr>
-  <p:timing>
-    <p:tnLst>
-      <p:par>
-        <p:cTn id="1" dur="indefinite" restart="never" nodeType="tmRoot"/>
-      </p:par>
-    </p:tnLst>
-  </p:timing>
-</p:sld>
-</file>
-
-<file path=ppt/slides/slide4.xml><?xml version="1.0" encoding="utf-8"?>
-<p:sld xmlns:a="http://schemas.openxmlformats.org/drawingml/2006/main" xmlns:r="http://schemas.openxmlformats.org/officeDocument/2006/relationships" xmlns:p="http://schemas.openxmlformats.org/presentationml/2006/main">
-  <p:cSld>
-    <p:spTree>
-      <p:nvGrpSpPr>
-        <p:cNvPr id="1" name=""/>
-        <p:cNvGrpSpPr/>
-        <p:nvPr/>
-      </p:nvGrpSpPr>
-      <p:grpSpPr>
-        <a:xfrm>
-          <a:off x="0" y="0"/>
-          <a:ext cx="0" cy="0"/>
-          <a:chOff x="0" y="0"/>
-          <a:chExt cx="0" cy="0"/>
-        </a:xfrm>
-      </p:grpSpPr>
-      <p:sp>
-        <p:nvSpPr>
-          <p:cNvPr id="3" name="矩形 2"/>
-          <p:cNvSpPr/>
-          <p:nvPr/>
-        </p:nvSpPr>
-        <p:spPr>
-          <a:xfrm>
-            <a:off x="5386228" y="6339227"/>
-            <a:ext cx="1391407" cy="369332"/>
-          </a:xfrm>
-          <a:prstGeom prst="rect">
-            <a:avLst/>
-          </a:prstGeom>
-        </p:spPr>
-        <p:txBody>
-          <a:bodyPr wrap="none">
-            <a:spAutoFit/>
-          </a:bodyPr>
-          <a:lstStyle/>
-          <a:p>
-            <a:r>
-              <a:rPr lang="zh-TW" altLang="en-US" dirty="0" smtClean="0"/>
-              <a:t>nature07112</a:t>
-            </a:r>
-            <a:endParaRPr lang="zh-TW" altLang="en-US" dirty="0"/>
-          </a:p>
-        </p:txBody>
-      </p:sp>
-      <p:pic>
-        <p:nvPicPr>
-          <p:cNvPr id="2" name="圖片 1"/>
-          <p:cNvPicPr>
-            <a:picLocks noChangeAspect="1"/>
-          </p:cNvPicPr>
-          <p:nvPr/>
-        </p:nvPicPr>
-        <p:blipFill>
-          <a:blip r:embed="rId2">
-            <a:extLst>
-              <a:ext uri="{28A0092B-C50C-407E-A947-70E740481C1C}">
-                <a14:useLocalDpi xmlns:a14="http://schemas.microsoft.com/office/drawing/2010/main" val="0"/>
-              </a:ext>
-            </a:extLst>
-          </a:blip>
-          <a:stretch>
-            <a:fillRect/>
-          </a:stretch>
-        </p:blipFill>
-        <p:spPr>
-          <a:xfrm>
-            <a:off x="997313" y="360217"/>
-            <a:ext cx="10169236" cy="5720195"/>
-          </a:xfrm>
-          <a:prstGeom prst="rect">
-            <a:avLst/>
-          </a:prstGeom>
-        </p:spPr>
-      </p:pic>
-    </p:spTree>
-    <p:extLst>
-      <p:ext uri="{BB962C8B-B14F-4D97-AF65-F5344CB8AC3E}">
-        <p14:creationId xmlns:p14="http://schemas.microsoft.com/office/powerpoint/2010/main" val="3167318453"/>
-      </p:ext>
-    </p:extLst>
-  </p:cSld>
-  <p:clrMapOvr>
-    <a:masterClrMapping/>
-  </p:clrMapOvr>
-  <p:timing>
-    <p:tnLst>
-      <p:par>
-        <p:cTn id="1" dur="indefinite" restart="never" nodeType="tmRoot"/>
-      </p:par>
-    </p:tnLst>
-  </p:timing>
-</p:sld>
-</file>
-
-<file path=ppt/slides/slide5.xml><?xml version="1.0" encoding="utf-8"?>
-<p:sld xmlns:a="http://schemas.openxmlformats.org/drawingml/2006/main" xmlns:r="http://schemas.openxmlformats.org/officeDocument/2006/relationships" xmlns:p="http://schemas.openxmlformats.org/presentationml/2006/main">
-  <p:cSld>
-    <p:spTree>
-      <p:nvGrpSpPr>
-        <p:cNvPr id="1" name=""/>
-        <p:cNvGrpSpPr/>
-        <p:nvPr/>
-      </p:nvGrpSpPr>
-      <p:grpSpPr>
-        <a:xfrm>
-          <a:off x="0" y="0"/>
-          <a:ext cx="0" cy="0"/>
-          <a:chOff x="0" y="0"/>
-          <a:chExt cx="0" cy="0"/>
-        </a:xfrm>
-      </p:grpSpPr>
-      <p:pic>
-        <p:nvPicPr>
-          <p:cNvPr id="2" name="圖片 1"/>
-          <p:cNvPicPr>
-            <a:picLocks noChangeAspect="1"/>
-          </p:cNvPicPr>
-          <p:nvPr/>
-        </p:nvPicPr>
-        <p:blipFill>
-          <a:blip r:embed="rId2">
-            <a:extLst>
-              <a:ext uri="{28A0092B-C50C-407E-A947-70E740481C1C}">
-                <a14:useLocalDpi xmlns:a14="http://schemas.microsoft.com/office/drawing/2010/main" val="0"/>
-              </a:ext>
-            </a:extLst>
-          </a:blip>
-          <a:stretch>
-            <a:fillRect/>
-          </a:stretch>
-        </p:blipFill>
-        <p:spPr>
-          <a:xfrm>
-            <a:off x="2446713" y="434879"/>
-            <a:ext cx="7279175" cy="5092601"/>
-          </a:xfrm>
-          <a:prstGeom prst="rect">
-            <a:avLst/>
-          </a:prstGeom>
-        </p:spPr>
-      </p:pic>
-      <p:sp>
-        <p:nvSpPr>
-          <p:cNvPr id="3" name="矩形 2"/>
-          <p:cNvSpPr/>
-          <p:nvPr/>
-        </p:nvSpPr>
-        <p:spPr>
-          <a:xfrm>
-            <a:off x="5390598" y="5973680"/>
-            <a:ext cx="1391407" cy="369332"/>
-          </a:xfrm>
-          <a:prstGeom prst="rect">
-            <a:avLst/>
-          </a:prstGeom>
-        </p:spPr>
-        <p:txBody>
-          <a:bodyPr wrap="none">
-            <a:spAutoFit/>
-          </a:bodyPr>
-          <a:lstStyle/>
-          <a:p>
-            <a:r>
-              <a:rPr lang="zh-TW" altLang="en-US" dirty="0" smtClean="0"/>
-              <a:t>nature05461</a:t>
-            </a:r>
-            <a:endParaRPr lang="zh-TW" altLang="en-US" dirty="0"/>
-          </a:p>
-        </p:txBody>
-      </p:sp>
-    </p:spTree>
-    <p:extLst>
-      <p:ext uri="{BB962C8B-B14F-4D97-AF65-F5344CB8AC3E}">
-        <p14:creationId xmlns:p14="http://schemas.microsoft.com/office/powerpoint/2010/main" val="534599401"/>
-      </p:ext>
-    </p:extLst>
-  </p:cSld>
-  <p:clrMapOvr>
-    <a:masterClrMapping/>
-  </p:clrMapOvr>
-  <p:timing>
-    <p:tnLst>
-      <p:par>
-        <p:cTn id="1" dur="indefinite" restart="never" nodeType="tmRoot"/>
-      </p:par>
-    </p:tnLst>
-  </p:timing>
-</p:sld>
-</file>
-
-<file path=ppt/slides/slide6.xml><?xml version="1.0" encoding="utf-8"?>
-<p:sld xmlns:a="http://schemas.openxmlformats.org/drawingml/2006/main" xmlns:r="http://schemas.openxmlformats.org/officeDocument/2006/relationships" xmlns:p="http://schemas.openxmlformats.org/presentationml/2006/main">
-  <p:cSld>
-    <p:spTree>
-      <p:nvGrpSpPr>
-        <p:cNvPr id="1" name=""/>
-        <p:cNvGrpSpPr/>
-        <p:nvPr/>
-      </p:nvGrpSpPr>
-      <p:grpSpPr>
-        <a:xfrm>
-          <a:off x="0" y="0"/>
-          <a:ext cx="0" cy="0"/>
-          <a:chOff x="0" y="0"/>
-          <a:chExt cx="0" cy="0"/>
-        </a:xfrm>
-      </p:grpSpPr>
-      <p:sp>
-        <p:nvSpPr>
-          <p:cNvPr id="6" name="矩形 5"/>
-          <p:cNvSpPr/>
-          <p:nvPr/>
-        </p:nvSpPr>
-        <p:spPr>
-          <a:xfrm>
-            <a:off x="5223671" y="6389315"/>
-            <a:ext cx="2195794" cy="369332"/>
-          </a:xfrm>
-          <a:prstGeom prst="rect">
-            <a:avLst/>
-          </a:prstGeom>
-        </p:spPr>
-        <p:txBody>
-          <a:bodyPr wrap="none">
-            <a:spAutoFit/>
-          </a:bodyPr>
-          <a:lstStyle/>
-          <a:p>
-            <a:r>
-              <a:rPr lang="zh-TW" altLang="en-US" dirty="0" smtClean="0"/>
-              <a:t>PhysRevA.81.042311</a:t>
-            </a:r>
-            <a:endParaRPr lang="zh-TW" altLang="en-US" dirty="0"/>
-          </a:p>
-        </p:txBody>
-      </p:sp>
-      <p:pic>
-        <p:nvPicPr>
-          <p:cNvPr id="9" name="圖片 8"/>
-          <p:cNvPicPr>
-            <a:picLocks noChangeAspect="1"/>
-          </p:cNvPicPr>
-          <p:nvPr/>
-        </p:nvPicPr>
-        <p:blipFill>
-          <a:blip r:embed="rId2" cstate="print">
-            <a:extLst>
-              <a:ext uri="{28A0092B-C50C-407E-A947-70E740481C1C}">
-                <a14:useLocalDpi xmlns:a14="http://schemas.microsoft.com/office/drawing/2010/main" val="0"/>
-              </a:ext>
-            </a:extLst>
-          </a:blip>
-          <a:stretch>
-            <a:fillRect/>
-          </a:stretch>
-        </p:blipFill>
-        <p:spPr>
-          <a:xfrm>
-            <a:off x="736454" y="741218"/>
-            <a:ext cx="11170228" cy="4468091"/>
-          </a:xfrm>
-          <a:prstGeom prst="rect">
-            <a:avLst/>
-          </a:prstGeom>
-        </p:spPr>
-      </p:pic>
-    </p:spTree>
-    <p:extLst>
-      <p:ext uri="{BB962C8B-B14F-4D97-AF65-F5344CB8AC3E}">
-        <p14:creationId xmlns:p14="http://schemas.microsoft.com/office/powerpoint/2010/main" val="3526632647"/>
-      </p:ext>
-    </p:extLst>
-  </p:cSld>
-  <p:clrMapOvr>
-    <a:masterClrMapping/>
-  </p:clrMapOvr>
-  <p:timing>
-    <p:tnLst>
-      <p:par>
-        <p:cTn id="1" dur="indefinite" restart="never" nodeType="tmRoot"/>
-      </p:par>
-    </p:tnLst>
-  </p:timing>
-</p:sld>
-</file>
-
-<file path=ppt/slides/slide7.xml><?xml version="1.0" encoding="utf-8"?>
-<p:sld xmlns:a="http://schemas.openxmlformats.org/drawingml/2006/main" xmlns:r="http://schemas.openxmlformats.org/officeDocument/2006/relationships" xmlns:p="http://schemas.openxmlformats.org/presentationml/2006/main">
-  <p:cSld>
-    <p:spTree>
-      <p:nvGrpSpPr>
-        <p:cNvPr id="1" name=""/>
-        <p:cNvGrpSpPr/>
-        <p:nvPr/>
-      </p:nvGrpSpPr>
-      <p:grpSpPr>
-        <a:xfrm>
-          <a:off x="0" y="0"/>
-          <a:ext cx="0" cy="0"/>
-          <a:chOff x="0" y="0"/>
-          <a:chExt cx="0" cy="0"/>
-        </a:xfrm>
-      </p:grpSpPr>
-      <p:pic>
-        <p:nvPicPr>
-          <p:cNvPr id="14" name="圖片 13"/>
-          <p:cNvPicPr>
-            <a:picLocks noChangeAspect="1"/>
-          </p:cNvPicPr>
-          <p:nvPr/>
-        </p:nvPicPr>
-        <p:blipFill>
-          <a:blip r:embed="rId2" cstate="print">
-            <a:extLst>
-              <a:ext uri="{28A0092B-C50C-407E-A947-70E740481C1C}">
-                <a14:useLocalDpi xmlns:a14="http://schemas.microsoft.com/office/drawing/2010/main" val="0"/>
-              </a:ext>
-            </a:extLst>
-          </a:blip>
-          <a:stretch>
-            <a:fillRect/>
-          </a:stretch>
-        </p:blipFill>
-        <p:spPr>
-          <a:xfrm>
-            <a:off x="3082638" y="235527"/>
-            <a:ext cx="5867400" cy="5867400"/>
-          </a:xfrm>
-          <a:prstGeom prst="rect">
-            <a:avLst/>
-          </a:prstGeom>
-        </p:spPr>
-      </p:pic>
-    </p:spTree>
-    <p:extLst>
-      <p:ext uri="{BB962C8B-B14F-4D97-AF65-F5344CB8AC3E}">
-        <p14:creationId xmlns:p14="http://schemas.microsoft.com/office/powerpoint/2010/main" val="4082675331"/>
-      </p:ext>
-    </p:extLst>
-  </p:cSld>
-  <p:clrMapOvr>
-    <a:masterClrMapping/>
-  </p:clrMapOvr>
-  <p:timing>
-    <p:tnLst>
-      <p:par>
-        <p:cTn id="1" dur="indefinite" restart="never" nodeType="tmRoot"/>
-      </p:par>
-    </p:tnLst>
-  </p:timing>
-</p:sld>
-</file>
-
-<file path=ppt/slides/slide8.xml><?xml version="1.0" encoding="utf-8"?>
-<p:sld xmlns:a="http://schemas.openxmlformats.org/drawingml/2006/main" xmlns:r="http://schemas.openxmlformats.org/officeDocument/2006/relationships" xmlns:p="http://schemas.openxmlformats.org/presentationml/2006/main">
-  <p:cSld>
-    <p:spTree>
-      <p:nvGrpSpPr>
-        <p:cNvPr id="1" name=""/>
-        <p:cNvGrpSpPr/>
-        <p:nvPr/>
-      </p:nvGrpSpPr>
-      <p:grpSpPr>
-        <a:xfrm>
-          <a:off x="0" y="0"/>
-          <a:ext cx="0" cy="0"/>
-          <a:chOff x="0" y="0"/>
-          <a:chExt cx="0" cy="0"/>
-        </a:xfrm>
-      </p:grpSpPr>
-      <p:pic>
-        <p:nvPicPr>
-          <p:cNvPr id="2" name="圖片 1"/>
-          <p:cNvPicPr>
-            <a:picLocks noChangeAspect="1"/>
-          </p:cNvPicPr>
-          <p:nvPr/>
-        </p:nvPicPr>
-        <p:blipFill>
-          <a:blip r:embed="rId2" cstate="print">
-            <a:extLst>
-              <a:ext uri="{28A0092B-C50C-407E-A947-70E740481C1C}">
-                <a14:useLocalDpi xmlns:a14="http://schemas.microsoft.com/office/drawing/2010/main" val="0"/>
-              </a:ext>
-            </a:extLst>
-          </a:blip>
-          <a:stretch>
-            <a:fillRect/>
-          </a:stretch>
-        </p:blipFill>
-        <p:spPr>
-          <a:xfrm>
-            <a:off x="1985962" y="280987"/>
-            <a:ext cx="8476487" cy="5650992"/>
-          </a:xfrm>
-          <a:prstGeom prst="rect">
-            <a:avLst/>
-          </a:prstGeom>
-        </p:spPr>
-      </p:pic>
-    </p:spTree>
-    <p:extLst>
-      <p:ext uri="{BB962C8B-B14F-4D97-AF65-F5344CB8AC3E}">
-        <p14:creationId xmlns:p14="http://schemas.microsoft.com/office/powerpoint/2010/main" val="2328048421"/>
-      </p:ext>
-    </p:extLst>
-  </p:cSld>
-  <p:clrMapOvr>
-    <a:masterClrMapping/>
-  </p:clrMapOvr>
-  <p:timing>
-    <p:tnLst>
-      <p:par>
-        <p:cTn id="1" dur="indefinite" restart="never" nodeType="tmRoot"/>
-      </p:par>
-    </p:tnLst>
-  </p:timing>
-</p:sld>
-</file>
-
-<file path=ppt/slides/slide9.xml><?xml version="1.0" encoding="utf-8"?>
-<p:sld xmlns:a="http://schemas.openxmlformats.org/drawingml/2006/main" xmlns:r="http://schemas.openxmlformats.org/officeDocument/2006/relationships" xmlns:p="http://schemas.openxmlformats.org/presentationml/2006/main">
-  <p:cSld>
-    <p:spTree>
-      <p:nvGrpSpPr>
-        <p:cNvPr id="1" name=""/>
-        <p:cNvGrpSpPr/>
-        <p:nvPr/>
-      </p:nvGrpSpPr>
-      <p:grpSpPr>
-        <a:xfrm>
-          <a:off x="0" y="0"/>
-          <a:ext cx="0" cy="0"/>
-          <a:chOff x="0" y="0"/>
-          <a:chExt cx="0" cy="0"/>
-        </a:xfrm>
-      </p:grpSpPr>
-      <p:pic>
-        <p:nvPicPr>
-          <p:cNvPr id="2" name="圖片 1"/>
-          <p:cNvPicPr>
-            <a:picLocks noChangeAspect="1"/>
-          </p:cNvPicPr>
-          <p:nvPr/>
-        </p:nvPicPr>
-        <p:blipFill>
-          <a:blip r:embed="rId2" cstate="print">
-            <a:extLst>
-              <a:ext uri="{28A0092B-C50C-407E-A947-70E740481C1C}">
-                <a14:useLocalDpi xmlns:a14="http://schemas.microsoft.com/office/drawing/2010/main" val="0"/>
-              </a:ext>
-            </a:extLst>
-          </a:blip>
-          <a:stretch>
-            <a:fillRect/>
-          </a:stretch>
-        </p:blipFill>
-        <p:spPr>
-          <a:xfrm>
-            <a:off x="1800225" y="233507"/>
-            <a:ext cx="8479412" cy="5652941"/>
-          </a:xfrm>
-          <a:prstGeom prst="rect">
-            <a:avLst/>
-          </a:prstGeom>
-        </p:spPr>
-      </p:pic>
-    </p:spTree>
-    <p:extLst>
-      <p:ext uri="{BB962C8B-B14F-4D97-AF65-F5344CB8AC3E}">
-        <p14:creationId xmlns:p14="http://schemas.microsoft.com/office/powerpoint/2010/main" val="1640291520"/>
       </p:ext>
     </p:extLst>
   </p:cSld>

</xml_diff>